<commit_message>
last version of powerpoint
</commit_message>
<xml_diff>
--- a/notes.pptx
+++ b/notes.pptx
@@ -13,6 +13,7 @@
     <p:sldId id="261" r:id="rId7"/>
     <p:sldId id="262" r:id="rId8"/>
     <p:sldId id="263" r:id="rId9"/>
+    <p:sldId id="264" r:id="rId10"/>
   </p:sldIdLst>
   <p:sldSz cx="12192000" cy="6858000"/>
   <p:notesSz cx="6858000" cy="9144000"/>
@@ -268,7 +269,7 @@
           <a:p>
             <a:fld id="{BB2F3524-2003-4F17-B837-632735CE37F4}" type="datetimeFigureOut">
               <a:rPr lang="fr-FR" smtClean="0"/>
-              <a:t>16/12/2020</a:t>
+              <a:t>17/12/2020</a:t>
             </a:fld>
             <a:endParaRPr lang="fr-FR"/>
           </a:p>
@@ -468,7 +469,7 @@
           <a:p>
             <a:fld id="{BB2F3524-2003-4F17-B837-632735CE37F4}" type="datetimeFigureOut">
               <a:rPr lang="fr-FR" smtClean="0"/>
-              <a:t>16/12/2020</a:t>
+              <a:t>17/12/2020</a:t>
             </a:fld>
             <a:endParaRPr lang="fr-FR"/>
           </a:p>
@@ -678,7 +679,7 @@
           <a:p>
             <a:fld id="{BB2F3524-2003-4F17-B837-632735CE37F4}" type="datetimeFigureOut">
               <a:rPr lang="fr-FR" smtClean="0"/>
-              <a:t>16/12/2020</a:t>
+              <a:t>17/12/2020</a:t>
             </a:fld>
             <a:endParaRPr lang="fr-FR"/>
           </a:p>
@@ -878,7 +879,7 @@
           <a:p>
             <a:fld id="{BB2F3524-2003-4F17-B837-632735CE37F4}" type="datetimeFigureOut">
               <a:rPr lang="fr-FR" smtClean="0"/>
-              <a:t>16/12/2020</a:t>
+              <a:t>17/12/2020</a:t>
             </a:fld>
             <a:endParaRPr lang="fr-FR"/>
           </a:p>
@@ -1154,7 +1155,7 @@
           <a:p>
             <a:fld id="{BB2F3524-2003-4F17-B837-632735CE37F4}" type="datetimeFigureOut">
               <a:rPr lang="fr-FR" smtClean="0"/>
-              <a:t>16/12/2020</a:t>
+              <a:t>17/12/2020</a:t>
             </a:fld>
             <a:endParaRPr lang="fr-FR"/>
           </a:p>
@@ -1422,7 +1423,7 @@
           <a:p>
             <a:fld id="{BB2F3524-2003-4F17-B837-632735CE37F4}" type="datetimeFigureOut">
               <a:rPr lang="fr-FR" smtClean="0"/>
-              <a:t>16/12/2020</a:t>
+              <a:t>17/12/2020</a:t>
             </a:fld>
             <a:endParaRPr lang="fr-FR"/>
           </a:p>
@@ -1837,7 +1838,7 @@
           <a:p>
             <a:fld id="{BB2F3524-2003-4F17-B837-632735CE37F4}" type="datetimeFigureOut">
               <a:rPr lang="fr-FR" smtClean="0"/>
-              <a:t>16/12/2020</a:t>
+              <a:t>17/12/2020</a:t>
             </a:fld>
             <a:endParaRPr lang="fr-FR"/>
           </a:p>
@@ -1979,7 +1980,7 @@
           <a:p>
             <a:fld id="{BB2F3524-2003-4F17-B837-632735CE37F4}" type="datetimeFigureOut">
               <a:rPr lang="fr-FR" smtClean="0"/>
-              <a:t>16/12/2020</a:t>
+              <a:t>17/12/2020</a:t>
             </a:fld>
             <a:endParaRPr lang="fr-FR"/>
           </a:p>
@@ -2092,7 +2093,7 @@
           <a:p>
             <a:fld id="{BB2F3524-2003-4F17-B837-632735CE37F4}" type="datetimeFigureOut">
               <a:rPr lang="fr-FR" smtClean="0"/>
-              <a:t>16/12/2020</a:t>
+              <a:t>17/12/2020</a:t>
             </a:fld>
             <a:endParaRPr lang="fr-FR"/>
           </a:p>
@@ -2405,7 +2406,7 @@
           <a:p>
             <a:fld id="{BB2F3524-2003-4F17-B837-632735CE37F4}" type="datetimeFigureOut">
               <a:rPr lang="fr-FR" smtClean="0"/>
-              <a:t>16/12/2020</a:t>
+              <a:t>17/12/2020</a:t>
             </a:fld>
             <a:endParaRPr lang="fr-FR"/>
           </a:p>
@@ -2694,7 +2695,7 @@
           <a:p>
             <a:fld id="{BB2F3524-2003-4F17-B837-632735CE37F4}" type="datetimeFigureOut">
               <a:rPr lang="fr-FR" smtClean="0"/>
-              <a:t>16/12/2020</a:t>
+              <a:t>17/12/2020</a:t>
             </a:fld>
             <a:endParaRPr lang="fr-FR"/>
           </a:p>
@@ -2937,7 +2938,7 @@
           <a:p>
             <a:fld id="{BB2F3524-2003-4F17-B837-632735CE37F4}" type="datetimeFigureOut">
               <a:rPr lang="fr-FR" smtClean="0"/>
-              <a:t>16/12/2020</a:t>
+              <a:t>17/12/2020</a:t>
             </a:fld>
             <a:endParaRPr lang="fr-FR"/>
           </a:p>
@@ -5787,15 +5788,15 @@
         </p:spPr>
         <p:style>
           <a:lnRef idx="2">
-            <a:schemeClr val="accent1">
+            <a:schemeClr val="accent3">
               <a:shade val="50000"/>
             </a:schemeClr>
           </a:lnRef>
           <a:fillRef idx="1">
-            <a:schemeClr val="accent1"/>
-          </a:fillRef>
-          <a:effectRef idx="0">
-            <a:schemeClr val="accent1"/>
+            <a:schemeClr val="accent3"/>
+          </a:fillRef>
+          <a:effectRef idx="0">
+            <a:schemeClr val="accent3"/>
           </a:effectRef>
           <a:fontRef idx="minor">
             <a:schemeClr val="lt1"/>
@@ -6020,7 +6021,7 @@
         </p:nvSpPr>
         <p:spPr>
           <a:xfrm>
-            <a:off x="1819275" y="2914649"/>
+            <a:off x="1980325" y="2776698"/>
             <a:ext cx="842963" cy="904876"/>
           </a:xfrm>
           <a:prstGeom prst="rect">
@@ -6049,6 +6050,359 @@
           <a:p>
             <a:pPr algn="ctr"/>
             <a:endParaRPr lang="fr-FR" dirty="0"/>
+          </a:p>
+        </p:txBody>
+      </p:sp>
+      <p:sp>
+        <p:nvSpPr>
+          <p:cNvPr id="10" name="Rectangle 9">
+            <a:extLst>
+              <a:ext uri="{FF2B5EF4-FFF2-40B4-BE49-F238E27FC236}">
+                <a16:creationId xmlns:a16="http://schemas.microsoft.com/office/drawing/2014/main" id="{C49A9021-7787-4EF2-A221-7B6A75EBA9C0}"/>
+              </a:ext>
+            </a:extLst>
+          </p:cNvPr>
+          <p:cNvSpPr/>
+          <p:nvPr/>
+        </p:nvSpPr>
+        <p:spPr>
+          <a:xfrm>
+            <a:off x="8274424" y="4267200"/>
+            <a:ext cx="1600200" cy="1795462"/>
+          </a:xfrm>
+          <a:prstGeom prst="rect">
+            <a:avLst/>
+          </a:prstGeom>
+        </p:spPr>
+        <p:style>
+          <a:lnRef idx="2">
+            <a:schemeClr val="accent1">
+              <a:shade val="50000"/>
+            </a:schemeClr>
+          </a:lnRef>
+          <a:fillRef idx="1">
+            <a:schemeClr val="accent1"/>
+          </a:fillRef>
+          <a:effectRef idx="0">
+            <a:schemeClr val="accent1"/>
+          </a:effectRef>
+          <a:fontRef idx="minor">
+            <a:schemeClr val="lt1"/>
+          </a:fontRef>
+        </p:style>
+        <p:txBody>
+          <a:bodyPr rtlCol="0" anchor="ctr"/>
+          <a:lstStyle/>
+          <a:p>
+            <a:pPr algn="ctr"/>
+            <a:endParaRPr lang="fr-FR"/>
+          </a:p>
+        </p:txBody>
+      </p:sp>
+      <p:sp>
+        <p:nvSpPr>
+          <p:cNvPr id="2" name="TextBox 1">
+            <a:extLst>
+              <a:ext uri="{FF2B5EF4-FFF2-40B4-BE49-F238E27FC236}">
+                <a16:creationId xmlns:a16="http://schemas.microsoft.com/office/drawing/2014/main" id="{3B1F57D3-3514-4534-A927-158EE120F795}"/>
+              </a:ext>
+            </a:extLst>
+          </p:cNvPr>
+          <p:cNvSpPr txBox="1"/>
+          <p:nvPr/>
+        </p:nvSpPr>
+        <p:spPr>
+          <a:xfrm>
+            <a:off x="8274424" y="3801035"/>
+            <a:ext cx="1602042" cy="369332"/>
+          </a:xfrm>
+          <a:prstGeom prst="rect">
+            <a:avLst/>
+          </a:prstGeom>
+          <a:noFill/>
+        </p:spPr>
+        <p:txBody>
+          <a:bodyPr wrap="none" rtlCol="0">
+            <a:spAutoFit/>
+          </a:bodyPr>
+          <a:lstStyle/>
+          <a:p>
+            <a:r>
+              <a:rPr lang="fr-FR" dirty="0"/>
+              <a:t>Localhost:3000</a:t>
+            </a:r>
+          </a:p>
+        </p:txBody>
+      </p:sp>
+      <p:sp>
+        <p:nvSpPr>
+          <p:cNvPr id="3" name="Cylinder 2">
+            <a:extLst>
+              <a:ext uri="{FF2B5EF4-FFF2-40B4-BE49-F238E27FC236}">
+                <a16:creationId xmlns:a16="http://schemas.microsoft.com/office/drawing/2014/main" id="{6D8A67E8-1876-4668-8EC2-F420FDA826D4}"/>
+              </a:ext>
+            </a:extLst>
+          </p:cNvPr>
+          <p:cNvSpPr/>
+          <p:nvPr/>
+        </p:nvSpPr>
+        <p:spPr>
+          <a:xfrm>
+            <a:off x="9982201" y="4710952"/>
+            <a:ext cx="1340223" cy="1743635"/>
+          </a:xfrm>
+          <a:prstGeom prst="can">
+            <a:avLst/>
+          </a:prstGeom>
+        </p:spPr>
+        <p:style>
+          <a:lnRef idx="2">
+            <a:schemeClr val="accent1">
+              <a:shade val="50000"/>
+            </a:schemeClr>
+          </a:lnRef>
+          <a:fillRef idx="1">
+            <a:schemeClr val="accent1"/>
+          </a:fillRef>
+          <a:effectRef idx="0">
+            <a:schemeClr val="accent1"/>
+          </a:effectRef>
+          <a:fontRef idx="minor">
+            <a:schemeClr val="lt1"/>
+          </a:fontRef>
+        </p:style>
+        <p:txBody>
+          <a:bodyPr rtlCol="0" anchor="ctr"/>
+          <a:lstStyle/>
+          <a:p>
+            <a:pPr algn="ctr"/>
+            <a:r>
+              <a:rPr lang="fr-FR" dirty="0" err="1"/>
+              <a:t>Postgre</a:t>
+            </a:r>
+            <a:endParaRPr lang="fr-FR" dirty="0"/>
+          </a:p>
+        </p:txBody>
+      </p:sp>
+      <p:cxnSp>
+        <p:nvCxnSpPr>
+          <p:cNvPr id="13" name="Straight Arrow Connector 12">
+            <a:extLst>
+              <a:ext uri="{FF2B5EF4-FFF2-40B4-BE49-F238E27FC236}">
+                <a16:creationId xmlns:a16="http://schemas.microsoft.com/office/drawing/2014/main" id="{174B8A2F-837F-4866-BC8C-FEEFA7C550A5}"/>
+              </a:ext>
+            </a:extLst>
+          </p:cNvPr>
+          <p:cNvCxnSpPr>
+            <a:stCxn id="10" idx="3"/>
+            <a:endCxn id="3" idx="2"/>
+          </p:cNvCxnSpPr>
+          <p:nvPr/>
+        </p:nvCxnSpPr>
+        <p:spPr>
+          <a:xfrm>
+            <a:off x="9874624" y="5164931"/>
+            <a:ext cx="107577" cy="417839"/>
+          </a:xfrm>
+          <a:prstGeom prst="straightConnector1">
+            <a:avLst/>
+          </a:prstGeom>
+          <a:ln w="76200">
+            <a:headEnd type="triangle"/>
+            <a:tailEnd type="triangle"/>
+          </a:ln>
+        </p:spPr>
+        <p:style>
+          <a:lnRef idx="1">
+            <a:schemeClr val="accent1"/>
+          </a:lnRef>
+          <a:fillRef idx="0">
+            <a:schemeClr val="accent1"/>
+          </a:fillRef>
+          <a:effectRef idx="0">
+            <a:schemeClr val="accent1"/>
+          </a:effectRef>
+          <a:fontRef idx="minor">
+            <a:schemeClr val="tx1"/>
+          </a:fontRef>
+        </p:style>
+      </p:cxnSp>
+      <p:cxnSp>
+        <p:nvCxnSpPr>
+          <p:cNvPr id="15" name="Straight Arrow Connector 14">
+            <a:extLst>
+              <a:ext uri="{FF2B5EF4-FFF2-40B4-BE49-F238E27FC236}">
+                <a16:creationId xmlns:a16="http://schemas.microsoft.com/office/drawing/2014/main" id="{1B90DE9D-1A3B-45AA-BC77-04C497C32EAD}"/>
+              </a:ext>
+            </a:extLst>
+          </p:cNvPr>
+          <p:cNvCxnSpPr>
+            <a:cxnSpLocks/>
+          </p:cNvCxnSpPr>
+          <p:nvPr/>
+        </p:nvCxnSpPr>
+        <p:spPr>
+          <a:xfrm>
+            <a:off x="2881313" y="3472185"/>
+            <a:ext cx="5504609" cy="1634097"/>
+          </a:xfrm>
+          <a:prstGeom prst="straightConnector1">
+            <a:avLst/>
+          </a:prstGeom>
+          <a:ln w="76200">
+            <a:tailEnd type="triangle"/>
+          </a:ln>
+        </p:spPr>
+        <p:style>
+          <a:lnRef idx="1">
+            <a:schemeClr val="accent1"/>
+          </a:lnRef>
+          <a:fillRef idx="0">
+            <a:schemeClr val="accent1"/>
+          </a:fillRef>
+          <a:effectRef idx="0">
+            <a:schemeClr val="accent1"/>
+          </a:effectRef>
+          <a:fontRef idx="minor">
+            <a:schemeClr val="tx1"/>
+          </a:fontRef>
+        </p:style>
+      </p:cxnSp>
+      <p:cxnSp>
+        <p:nvCxnSpPr>
+          <p:cNvPr id="17" name="Straight Arrow Connector 16">
+            <a:extLst>
+              <a:ext uri="{FF2B5EF4-FFF2-40B4-BE49-F238E27FC236}">
+                <a16:creationId xmlns:a16="http://schemas.microsoft.com/office/drawing/2014/main" id="{3851EE89-DAD5-4F05-B780-F065DA5C0929}"/>
+              </a:ext>
+            </a:extLst>
+          </p:cNvPr>
+          <p:cNvCxnSpPr/>
+          <p:nvPr/>
+        </p:nvCxnSpPr>
+        <p:spPr>
+          <a:xfrm flipH="1" flipV="1">
+            <a:off x="2631142" y="3726978"/>
+            <a:ext cx="5643282" cy="1779494"/>
+          </a:xfrm>
+          <a:prstGeom prst="straightConnector1">
+            <a:avLst/>
+          </a:prstGeom>
+          <a:ln w="76200">
+            <a:tailEnd type="triangle"/>
+          </a:ln>
+        </p:spPr>
+        <p:style>
+          <a:lnRef idx="1">
+            <a:schemeClr val="accent1"/>
+          </a:lnRef>
+          <a:fillRef idx="0">
+            <a:schemeClr val="accent1"/>
+          </a:fillRef>
+          <a:effectRef idx="0">
+            <a:schemeClr val="accent1"/>
+          </a:effectRef>
+          <a:fontRef idx="minor">
+            <a:schemeClr val="tx1"/>
+          </a:fontRef>
+        </p:style>
+      </p:cxnSp>
+      <p:sp>
+        <p:nvSpPr>
+          <p:cNvPr id="18" name="Cylinder 17">
+            <a:extLst>
+              <a:ext uri="{FF2B5EF4-FFF2-40B4-BE49-F238E27FC236}">
+                <a16:creationId xmlns:a16="http://schemas.microsoft.com/office/drawing/2014/main" id="{F8B7572D-720D-40E8-9E69-00A8330C619B}"/>
+              </a:ext>
+            </a:extLst>
+          </p:cNvPr>
+          <p:cNvSpPr/>
+          <p:nvPr/>
+        </p:nvSpPr>
+        <p:spPr>
+          <a:xfrm>
+            <a:off x="1129553" y="2366403"/>
+            <a:ext cx="582145" cy="1241891"/>
+          </a:xfrm>
+          <a:prstGeom prst="can">
+            <a:avLst/>
+          </a:prstGeom>
+        </p:spPr>
+        <p:style>
+          <a:lnRef idx="2">
+            <a:schemeClr val="accent1">
+              <a:shade val="50000"/>
+            </a:schemeClr>
+          </a:lnRef>
+          <a:fillRef idx="1">
+            <a:schemeClr val="accent1"/>
+          </a:fillRef>
+          <a:effectRef idx="0">
+            <a:schemeClr val="accent1"/>
+          </a:effectRef>
+          <a:fontRef idx="minor">
+            <a:schemeClr val="lt1"/>
+          </a:fontRef>
+        </p:style>
+        <p:txBody>
+          <a:bodyPr rtlCol="0" anchor="ctr"/>
+          <a:lstStyle/>
+          <a:p>
+            <a:pPr algn="ctr"/>
+            <a:r>
+              <a:rPr lang="fr-FR" dirty="0" err="1"/>
+              <a:t>localstorage</a:t>
+            </a:r>
+            <a:endParaRPr lang="fr-FR" dirty="0"/>
+          </a:p>
+        </p:txBody>
+      </p:sp>
+      <p:sp>
+        <p:nvSpPr>
+          <p:cNvPr id="21" name="Rectangle 20">
+            <a:extLst>
+              <a:ext uri="{FF2B5EF4-FFF2-40B4-BE49-F238E27FC236}">
+                <a16:creationId xmlns:a16="http://schemas.microsoft.com/office/drawing/2014/main" id="{E1D797F8-8157-4A5F-B79B-CD5A094D8C7A}"/>
+              </a:ext>
+            </a:extLst>
+          </p:cNvPr>
+          <p:cNvSpPr/>
+          <p:nvPr/>
+        </p:nvSpPr>
+        <p:spPr>
+          <a:xfrm>
+            <a:off x="7920038" y="4694725"/>
+            <a:ext cx="919162" cy="1074063"/>
+          </a:xfrm>
+          <a:prstGeom prst="rect">
+            <a:avLst/>
+          </a:prstGeom>
+        </p:spPr>
+        <p:style>
+          <a:lnRef idx="2">
+            <a:schemeClr val="accent5">
+              <a:shade val="50000"/>
+            </a:schemeClr>
+          </a:lnRef>
+          <a:fillRef idx="1">
+            <a:schemeClr val="accent5"/>
+          </a:fillRef>
+          <a:effectRef idx="0">
+            <a:schemeClr val="accent5"/>
+          </a:effectRef>
+          <a:fontRef idx="minor">
+            <a:schemeClr val="lt1"/>
+          </a:fontRef>
+        </p:style>
+        <p:txBody>
+          <a:bodyPr rtlCol="0" anchor="ctr"/>
+          <a:lstStyle/>
+          <a:p>
+            <a:pPr algn="ctr"/>
+            <a:r>
+              <a:rPr lang="fr-FR" dirty="0"/>
+              <a:t>cors</a:t>
+            </a:r>
           </a:p>
         </p:txBody>
       </p:sp>
@@ -7796,6 +8150,756 @@
     <p:extLst>
       <p:ext uri="{BB962C8B-B14F-4D97-AF65-F5344CB8AC3E}">
         <p14:creationId xmlns:p14="http://schemas.microsoft.com/office/powerpoint/2010/main" val="412961817"/>
+      </p:ext>
+    </p:extLst>
+  </p:cSld>
+  <p:clrMapOvr>
+    <a:masterClrMapping/>
+  </p:clrMapOvr>
+</p:sld>
+</file>
+
+<file path=ppt/slides/slide9.xml><?xml version="1.0" encoding="utf-8"?>
+<p:sld xmlns:a="http://schemas.openxmlformats.org/drawingml/2006/main" xmlns:r="http://schemas.openxmlformats.org/officeDocument/2006/relationships" xmlns:p="http://schemas.openxmlformats.org/presentationml/2006/main">
+  <p:cSld>
+    <p:spTree>
+      <p:nvGrpSpPr>
+        <p:cNvPr id="1" name=""/>
+        <p:cNvGrpSpPr/>
+        <p:nvPr/>
+      </p:nvGrpSpPr>
+      <p:grpSpPr>
+        <a:xfrm>
+          <a:off x="0" y="0"/>
+          <a:ext cx="0" cy="0"/>
+          <a:chOff x="0" y="0"/>
+          <a:chExt cx="0" cy="0"/>
+        </a:xfrm>
+      </p:grpSpPr>
+      <p:sp>
+        <p:nvSpPr>
+          <p:cNvPr id="4" name="Rectangle 3">
+            <a:extLst>
+              <a:ext uri="{FF2B5EF4-FFF2-40B4-BE49-F238E27FC236}">
+                <a16:creationId xmlns:a16="http://schemas.microsoft.com/office/drawing/2014/main" id="{87927BCB-5168-4C18-B8AE-6CB7C8CA6179}"/>
+              </a:ext>
+            </a:extLst>
+          </p:cNvPr>
+          <p:cNvSpPr/>
+          <p:nvPr/>
+        </p:nvSpPr>
+        <p:spPr>
+          <a:xfrm>
+            <a:off x="683568" y="1844824"/>
+            <a:ext cx="2376264" cy="360040"/>
+          </a:xfrm>
+          <a:prstGeom prst="rect">
+            <a:avLst/>
+          </a:prstGeom>
+        </p:spPr>
+        <p:style>
+          <a:lnRef idx="2">
+            <a:schemeClr val="accent2">
+              <a:shade val="50000"/>
+            </a:schemeClr>
+          </a:lnRef>
+          <a:fillRef idx="1">
+            <a:schemeClr val="accent2"/>
+          </a:fillRef>
+          <a:effectRef idx="0">
+            <a:schemeClr val="accent2"/>
+          </a:effectRef>
+          <a:fontRef idx="minor">
+            <a:schemeClr val="lt1"/>
+          </a:fontRef>
+        </p:style>
+        <p:txBody>
+          <a:bodyPr rtlCol="0" anchor="ctr"/>
+          <a:lstStyle/>
+          <a:p>
+            <a:pPr algn="ctr"/>
+            <a:r>
+              <a:rPr lang="fr-FR" dirty="0"/>
+              <a:t>METHOD /</a:t>
+            </a:r>
+            <a:r>
+              <a:rPr lang="fr-FR" dirty="0" err="1"/>
+              <a:t>path</a:t>
+            </a:r>
+            <a:r>
+              <a:rPr lang="fr-FR" dirty="0"/>
+              <a:t> version</a:t>
+            </a:r>
+          </a:p>
+        </p:txBody>
+      </p:sp>
+      <p:sp>
+        <p:nvSpPr>
+          <p:cNvPr id="5" name="Rectangle 4">
+            <a:extLst>
+              <a:ext uri="{FF2B5EF4-FFF2-40B4-BE49-F238E27FC236}">
+                <a16:creationId xmlns:a16="http://schemas.microsoft.com/office/drawing/2014/main" id="{2E33E0E9-4574-4503-97A3-BD90EB581D83}"/>
+              </a:ext>
+            </a:extLst>
+          </p:cNvPr>
+          <p:cNvSpPr/>
+          <p:nvPr/>
+        </p:nvSpPr>
+        <p:spPr>
+          <a:xfrm>
+            <a:off x="683568" y="2312876"/>
+            <a:ext cx="2376264" cy="1440160"/>
+          </a:xfrm>
+          <a:prstGeom prst="rect">
+            <a:avLst/>
+          </a:prstGeom>
+        </p:spPr>
+        <p:style>
+          <a:lnRef idx="2">
+            <a:schemeClr val="accent3">
+              <a:shade val="50000"/>
+            </a:schemeClr>
+          </a:lnRef>
+          <a:fillRef idx="1">
+            <a:schemeClr val="accent3"/>
+          </a:fillRef>
+          <a:effectRef idx="0">
+            <a:schemeClr val="accent3"/>
+          </a:effectRef>
+          <a:fontRef idx="minor">
+            <a:schemeClr val="lt1"/>
+          </a:fontRef>
+        </p:style>
+        <p:txBody>
+          <a:bodyPr rtlCol="0" anchor="t"/>
+          <a:lstStyle/>
+          <a:p>
+            <a:r>
+              <a:rPr lang="fr-FR" dirty="0"/>
+              <a:t>Clé: valeur</a:t>
+            </a:r>
+          </a:p>
+          <a:p>
+            <a:r>
+              <a:rPr lang="fr-FR" dirty="0"/>
+              <a:t>Autre-Clé: a=1; b=2</a:t>
+            </a:r>
+          </a:p>
+          <a:p>
+            <a:r>
+              <a:rPr lang="fr-FR" dirty="0"/>
+              <a:t>…</a:t>
+            </a:r>
+          </a:p>
+          <a:p>
+            <a:r>
+              <a:rPr lang="fr-FR" dirty="0"/>
+              <a:t>…</a:t>
+            </a:r>
+          </a:p>
+          <a:p>
+            <a:r>
+              <a:rPr lang="fr-FR" dirty="0"/>
+              <a:t>\n</a:t>
+            </a:r>
+          </a:p>
+          <a:p>
+            <a:endParaRPr lang="fr-FR" dirty="0"/>
+          </a:p>
+          <a:p>
+            <a:pPr algn="ctr"/>
+            <a:endParaRPr lang="fr-FR" dirty="0"/>
+          </a:p>
+        </p:txBody>
+      </p:sp>
+      <p:sp>
+        <p:nvSpPr>
+          <p:cNvPr id="6" name="Rectangle 5">
+            <a:extLst>
+              <a:ext uri="{FF2B5EF4-FFF2-40B4-BE49-F238E27FC236}">
+                <a16:creationId xmlns:a16="http://schemas.microsoft.com/office/drawing/2014/main" id="{E5F85DA9-F1F3-4050-8B75-012F2F6A77B3}"/>
+              </a:ext>
+            </a:extLst>
+          </p:cNvPr>
+          <p:cNvSpPr/>
+          <p:nvPr/>
+        </p:nvSpPr>
+        <p:spPr>
+          <a:xfrm>
+            <a:off x="683568" y="4365104"/>
+            <a:ext cx="2376264" cy="1440160"/>
+          </a:xfrm>
+          <a:prstGeom prst="rect">
+            <a:avLst/>
+          </a:prstGeom>
+        </p:spPr>
+        <p:style>
+          <a:lnRef idx="2">
+            <a:schemeClr val="accent1">
+              <a:shade val="50000"/>
+            </a:schemeClr>
+          </a:lnRef>
+          <a:fillRef idx="1">
+            <a:schemeClr val="accent1"/>
+          </a:fillRef>
+          <a:effectRef idx="0">
+            <a:schemeClr val="accent1"/>
+          </a:effectRef>
+          <a:fontRef idx="minor">
+            <a:schemeClr val="lt1"/>
+          </a:fontRef>
+        </p:style>
+        <p:txBody>
+          <a:bodyPr rtlCol="0" anchor="t"/>
+          <a:lstStyle/>
+          <a:p>
+            <a:r>
+              <a:rPr lang="fr-FR" dirty="0"/>
+              <a:t>Body : contenu libre, format du contenu déclaré dans l’entête par Content-Type et Content-Length</a:t>
+            </a:r>
+          </a:p>
+          <a:p>
+            <a:endParaRPr lang="fr-FR" dirty="0"/>
+          </a:p>
+          <a:p>
+            <a:pPr algn="ctr"/>
+            <a:endParaRPr lang="fr-FR" dirty="0"/>
+          </a:p>
+        </p:txBody>
+      </p:sp>
+      <p:sp>
+        <p:nvSpPr>
+          <p:cNvPr id="7" name="TextBox 6">
+            <a:extLst>
+              <a:ext uri="{FF2B5EF4-FFF2-40B4-BE49-F238E27FC236}">
+                <a16:creationId xmlns:a16="http://schemas.microsoft.com/office/drawing/2014/main" id="{D686A43F-1EB9-474F-9D34-8E76DFA835EA}"/>
+              </a:ext>
+            </a:extLst>
+          </p:cNvPr>
+          <p:cNvSpPr txBox="1"/>
+          <p:nvPr/>
+        </p:nvSpPr>
+        <p:spPr>
+          <a:xfrm>
+            <a:off x="1043608" y="1336539"/>
+            <a:ext cx="1512145" cy="369332"/>
+          </a:xfrm>
+          <a:prstGeom prst="rect">
+            <a:avLst/>
+          </a:prstGeom>
+          <a:noFill/>
+        </p:spPr>
+        <p:txBody>
+          <a:bodyPr wrap="none" rtlCol="0">
+            <a:spAutoFit/>
+          </a:bodyPr>
+          <a:lstStyle/>
+          <a:p>
+            <a:r>
+              <a:rPr lang="fr-FR" dirty="0"/>
+              <a:t>Requête HTTP</a:t>
+            </a:r>
+          </a:p>
+        </p:txBody>
+      </p:sp>
+      <p:sp>
+        <p:nvSpPr>
+          <p:cNvPr id="8" name="Rectangle 7">
+            <a:extLst>
+              <a:ext uri="{FF2B5EF4-FFF2-40B4-BE49-F238E27FC236}">
+                <a16:creationId xmlns:a16="http://schemas.microsoft.com/office/drawing/2014/main" id="{5A65A276-01E3-4AA2-86D1-DAB2A161448D}"/>
+              </a:ext>
+            </a:extLst>
+          </p:cNvPr>
+          <p:cNvSpPr/>
+          <p:nvPr/>
+        </p:nvSpPr>
+        <p:spPr>
+          <a:xfrm>
+            <a:off x="4428772" y="1853547"/>
+            <a:ext cx="2376264" cy="360040"/>
+          </a:xfrm>
+          <a:prstGeom prst="rect">
+            <a:avLst/>
+          </a:prstGeom>
+        </p:spPr>
+        <p:style>
+          <a:lnRef idx="2">
+            <a:schemeClr val="accent2">
+              <a:shade val="50000"/>
+            </a:schemeClr>
+          </a:lnRef>
+          <a:fillRef idx="1">
+            <a:schemeClr val="accent2"/>
+          </a:fillRef>
+          <a:effectRef idx="0">
+            <a:schemeClr val="accent2"/>
+          </a:effectRef>
+          <a:fontRef idx="minor">
+            <a:schemeClr val="lt1"/>
+          </a:fontRef>
+        </p:style>
+        <p:txBody>
+          <a:bodyPr rtlCol="0" anchor="ctr"/>
+          <a:lstStyle/>
+          <a:p>
+            <a:pPr algn="ctr"/>
+            <a:r>
+              <a:rPr lang="fr-FR" dirty="0"/>
+              <a:t>Version code message</a:t>
+            </a:r>
+          </a:p>
+        </p:txBody>
+      </p:sp>
+      <p:sp>
+        <p:nvSpPr>
+          <p:cNvPr id="9" name="Rectangle 8">
+            <a:extLst>
+              <a:ext uri="{FF2B5EF4-FFF2-40B4-BE49-F238E27FC236}">
+                <a16:creationId xmlns:a16="http://schemas.microsoft.com/office/drawing/2014/main" id="{AC331A0E-C064-4256-AC1B-FBD78B9DD442}"/>
+              </a:ext>
+            </a:extLst>
+          </p:cNvPr>
+          <p:cNvSpPr/>
+          <p:nvPr/>
+        </p:nvSpPr>
+        <p:spPr>
+          <a:xfrm>
+            <a:off x="4430184" y="2357603"/>
+            <a:ext cx="2376264" cy="1440160"/>
+          </a:xfrm>
+          <a:prstGeom prst="rect">
+            <a:avLst/>
+          </a:prstGeom>
+        </p:spPr>
+        <p:style>
+          <a:lnRef idx="2">
+            <a:schemeClr val="accent3">
+              <a:shade val="50000"/>
+            </a:schemeClr>
+          </a:lnRef>
+          <a:fillRef idx="1">
+            <a:schemeClr val="accent3"/>
+          </a:fillRef>
+          <a:effectRef idx="0">
+            <a:schemeClr val="accent3"/>
+          </a:effectRef>
+          <a:fontRef idx="minor">
+            <a:schemeClr val="lt1"/>
+          </a:fontRef>
+        </p:style>
+        <p:txBody>
+          <a:bodyPr rtlCol="0" anchor="t"/>
+          <a:lstStyle/>
+          <a:p>
+            <a:r>
+              <a:rPr lang="fr-FR" dirty="0"/>
+              <a:t>Clé: valeur</a:t>
+            </a:r>
+          </a:p>
+          <a:p>
+            <a:r>
+              <a:rPr lang="fr-FR" dirty="0"/>
+              <a:t>Autre-Clé: a=1; b=2</a:t>
+            </a:r>
+          </a:p>
+          <a:p>
+            <a:r>
+              <a:rPr lang="fr-FR" dirty="0"/>
+              <a:t>…</a:t>
+            </a:r>
+          </a:p>
+          <a:p>
+            <a:r>
+              <a:rPr lang="fr-FR" dirty="0"/>
+              <a:t>…</a:t>
+            </a:r>
+          </a:p>
+          <a:p>
+            <a:r>
+              <a:rPr lang="fr-FR" dirty="0"/>
+              <a:t>\n</a:t>
+            </a:r>
+          </a:p>
+          <a:p>
+            <a:endParaRPr lang="fr-FR" dirty="0"/>
+          </a:p>
+          <a:p>
+            <a:pPr algn="ctr"/>
+            <a:endParaRPr lang="fr-FR" dirty="0"/>
+          </a:p>
+        </p:txBody>
+      </p:sp>
+      <p:sp>
+        <p:nvSpPr>
+          <p:cNvPr id="10" name="Rectangle 9">
+            <a:extLst>
+              <a:ext uri="{FF2B5EF4-FFF2-40B4-BE49-F238E27FC236}">
+                <a16:creationId xmlns:a16="http://schemas.microsoft.com/office/drawing/2014/main" id="{B712BF4E-2E78-43D6-A83B-A0ACB62B1D07}"/>
+              </a:ext>
+            </a:extLst>
+          </p:cNvPr>
+          <p:cNvSpPr/>
+          <p:nvPr/>
+        </p:nvSpPr>
+        <p:spPr>
+          <a:xfrm>
+            <a:off x="4428772" y="4365104"/>
+            <a:ext cx="2376264" cy="1440160"/>
+          </a:xfrm>
+          <a:prstGeom prst="rect">
+            <a:avLst/>
+          </a:prstGeom>
+        </p:spPr>
+        <p:style>
+          <a:lnRef idx="2">
+            <a:schemeClr val="accent1">
+              <a:shade val="50000"/>
+            </a:schemeClr>
+          </a:lnRef>
+          <a:fillRef idx="1">
+            <a:schemeClr val="accent1"/>
+          </a:fillRef>
+          <a:effectRef idx="0">
+            <a:schemeClr val="accent1"/>
+          </a:effectRef>
+          <a:fontRef idx="minor">
+            <a:schemeClr val="lt1"/>
+          </a:fontRef>
+        </p:style>
+        <p:txBody>
+          <a:bodyPr rtlCol="0" anchor="t"/>
+          <a:lstStyle/>
+          <a:p>
+            <a:r>
+              <a:rPr lang="fr-FR" dirty="0"/>
+              <a:t>Body : contenu libre, format du contenu déclaré dans l’entête par Content-Type et Content-Length</a:t>
+            </a:r>
+          </a:p>
+          <a:p>
+            <a:endParaRPr lang="fr-FR" dirty="0"/>
+          </a:p>
+          <a:p>
+            <a:pPr algn="ctr"/>
+            <a:endParaRPr lang="fr-FR" dirty="0"/>
+          </a:p>
+        </p:txBody>
+      </p:sp>
+      <p:sp>
+        <p:nvSpPr>
+          <p:cNvPr id="11" name="TextBox 10">
+            <a:extLst>
+              <a:ext uri="{FF2B5EF4-FFF2-40B4-BE49-F238E27FC236}">
+                <a16:creationId xmlns:a16="http://schemas.microsoft.com/office/drawing/2014/main" id="{71DE9F1B-FD1C-4A3A-8FD4-C499BF9B96E6}"/>
+              </a:ext>
+            </a:extLst>
+          </p:cNvPr>
+          <p:cNvSpPr txBox="1"/>
+          <p:nvPr/>
+        </p:nvSpPr>
+        <p:spPr>
+          <a:xfrm>
+            <a:off x="4788812" y="1345262"/>
+            <a:ext cx="1535100" cy="369332"/>
+          </a:xfrm>
+          <a:prstGeom prst="rect">
+            <a:avLst/>
+          </a:prstGeom>
+          <a:noFill/>
+        </p:spPr>
+        <p:txBody>
+          <a:bodyPr wrap="none" rtlCol="0">
+            <a:spAutoFit/>
+          </a:bodyPr>
+          <a:lstStyle/>
+          <a:p>
+            <a:r>
+              <a:rPr lang="fr-FR" dirty="0"/>
+              <a:t>Réponse HTTP</a:t>
+            </a:r>
+          </a:p>
+        </p:txBody>
+      </p:sp>
+      <p:sp>
+        <p:nvSpPr>
+          <p:cNvPr id="12" name="TextBox 11">
+            <a:extLst>
+              <a:ext uri="{FF2B5EF4-FFF2-40B4-BE49-F238E27FC236}">
+                <a16:creationId xmlns:a16="http://schemas.microsoft.com/office/drawing/2014/main" id="{26AB8B95-7011-415A-B6F0-84CEC61D01F9}"/>
+              </a:ext>
+            </a:extLst>
+          </p:cNvPr>
+          <p:cNvSpPr txBox="1"/>
+          <p:nvPr/>
+        </p:nvSpPr>
+        <p:spPr>
+          <a:xfrm>
+            <a:off x="3348169" y="2780928"/>
+            <a:ext cx="795089" cy="369332"/>
+          </a:xfrm>
+          <a:prstGeom prst="rect">
+            <a:avLst/>
+          </a:prstGeom>
+          <a:noFill/>
+        </p:spPr>
+        <p:txBody>
+          <a:bodyPr wrap="none" rtlCol="0">
+            <a:spAutoFit/>
+          </a:bodyPr>
+          <a:lstStyle/>
+          <a:p>
+            <a:r>
+              <a:rPr lang="fr-FR" dirty="0"/>
+              <a:t>Entête</a:t>
+            </a:r>
+          </a:p>
+        </p:txBody>
+      </p:sp>
+      <p:sp>
+        <p:nvSpPr>
+          <p:cNvPr id="13" name="TextBox 12">
+            <a:extLst>
+              <a:ext uri="{FF2B5EF4-FFF2-40B4-BE49-F238E27FC236}">
+                <a16:creationId xmlns:a16="http://schemas.microsoft.com/office/drawing/2014/main" id="{F84421E5-8AE4-45A3-81D3-5E59CA65D458}"/>
+              </a:ext>
+            </a:extLst>
+          </p:cNvPr>
+          <p:cNvSpPr txBox="1"/>
+          <p:nvPr/>
+        </p:nvSpPr>
+        <p:spPr>
+          <a:xfrm>
+            <a:off x="3419872" y="4509120"/>
+            <a:ext cx="657552" cy="369332"/>
+          </a:xfrm>
+          <a:prstGeom prst="rect">
+            <a:avLst/>
+          </a:prstGeom>
+          <a:noFill/>
+        </p:spPr>
+        <p:txBody>
+          <a:bodyPr wrap="none" rtlCol="0">
+            <a:spAutoFit/>
+          </a:bodyPr>
+          <a:lstStyle/>
+          <a:p>
+            <a:r>
+              <a:rPr lang="fr-FR" dirty="0"/>
+              <a:t>Body</a:t>
+            </a:r>
+          </a:p>
+        </p:txBody>
+      </p:sp>
+      <p:sp>
+        <p:nvSpPr>
+          <p:cNvPr id="14" name="TextBox 13">
+            <a:extLst>
+              <a:ext uri="{FF2B5EF4-FFF2-40B4-BE49-F238E27FC236}">
+                <a16:creationId xmlns:a16="http://schemas.microsoft.com/office/drawing/2014/main" id="{98795FD8-E3ED-47D2-97B2-883D20CE4F73}"/>
+              </a:ext>
+            </a:extLst>
+          </p:cNvPr>
+          <p:cNvSpPr txBox="1"/>
+          <p:nvPr/>
+        </p:nvSpPr>
+        <p:spPr>
+          <a:xfrm>
+            <a:off x="395536" y="6021288"/>
+            <a:ext cx="7106304" cy="646331"/>
+          </a:xfrm>
+          <a:prstGeom prst="rect">
+            <a:avLst/>
+          </a:prstGeom>
+          <a:noFill/>
+        </p:spPr>
+        <p:txBody>
+          <a:bodyPr wrap="none" rtlCol="0">
+            <a:spAutoFit/>
+          </a:bodyPr>
+          <a:lstStyle/>
+          <a:p>
+            <a:r>
+              <a:rPr lang="fr-FR" dirty="0"/>
+              <a:t>IP est le protocole que tout le monde utilise pour la couche transport.</a:t>
+            </a:r>
+          </a:p>
+          <a:p>
+            <a:r>
+              <a:rPr lang="fr-FR" dirty="0"/>
+              <a:t>HTTP est le protocole que tout le monde utilise pour la couche applicative.</a:t>
+            </a:r>
+          </a:p>
+        </p:txBody>
+      </p:sp>
+      <p:sp>
+        <p:nvSpPr>
+          <p:cNvPr id="15" name="TextBox 14">
+            <a:extLst>
+              <a:ext uri="{FF2B5EF4-FFF2-40B4-BE49-F238E27FC236}">
+                <a16:creationId xmlns:a16="http://schemas.microsoft.com/office/drawing/2014/main" id="{1BDA12F9-8256-4D1D-83F7-82FF895B13E8}"/>
+              </a:ext>
+            </a:extLst>
+          </p:cNvPr>
+          <p:cNvSpPr txBox="1"/>
+          <p:nvPr/>
+        </p:nvSpPr>
+        <p:spPr>
+          <a:xfrm>
+            <a:off x="7308304" y="2708920"/>
+            <a:ext cx="1004955" cy="369332"/>
+          </a:xfrm>
+          <a:prstGeom prst="rect">
+            <a:avLst/>
+          </a:prstGeom>
+          <a:noFill/>
+        </p:spPr>
+        <p:txBody>
+          <a:bodyPr wrap="none" rtlCol="0">
+            <a:spAutoFit/>
+          </a:bodyPr>
+          <a:lstStyle/>
+          <a:p>
+            <a:r>
+              <a:rPr lang="fr-FR" dirty="0"/>
+              <a:t>RFC2616</a:t>
+            </a:r>
+          </a:p>
+        </p:txBody>
+      </p:sp>
+      <p:sp>
+        <p:nvSpPr>
+          <p:cNvPr id="16" name="Rectangle 15">
+            <a:extLst>
+              <a:ext uri="{FF2B5EF4-FFF2-40B4-BE49-F238E27FC236}">
+                <a16:creationId xmlns:a16="http://schemas.microsoft.com/office/drawing/2014/main" id="{1DDE1A9B-3E2B-4D93-A17A-C34AF065096C}"/>
+              </a:ext>
+            </a:extLst>
+          </p:cNvPr>
+          <p:cNvSpPr/>
+          <p:nvPr/>
+        </p:nvSpPr>
+        <p:spPr>
+          <a:xfrm>
+            <a:off x="683568" y="3897052"/>
+            <a:ext cx="2376264" cy="360040"/>
+          </a:xfrm>
+          <a:prstGeom prst="rect">
+            <a:avLst/>
+          </a:prstGeom>
+        </p:spPr>
+        <p:style>
+          <a:lnRef idx="2">
+            <a:schemeClr val="accent5">
+              <a:shade val="50000"/>
+            </a:schemeClr>
+          </a:lnRef>
+          <a:fillRef idx="1">
+            <a:schemeClr val="accent5"/>
+          </a:fillRef>
+          <a:effectRef idx="0">
+            <a:schemeClr val="accent5"/>
+          </a:effectRef>
+          <a:fontRef idx="minor">
+            <a:schemeClr val="lt1"/>
+          </a:fontRef>
+        </p:style>
+        <p:txBody>
+          <a:bodyPr rtlCol="0" anchor="ctr"/>
+          <a:lstStyle/>
+          <a:p>
+            <a:r>
+              <a:rPr lang="fr-FR" dirty="0"/>
+              <a:t>\n</a:t>
+            </a:r>
+          </a:p>
+        </p:txBody>
+      </p:sp>
+      <p:sp>
+        <p:nvSpPr>
+          <p:cNvPr id="17" name="Rectangle 16">
+            <a:extLst>
+              <a:ext uri="{FF2B5EF4-FFF2-40B4-BE49-F238E27FC236}">
+                <a16:creationId xmlns:a16="http://schemas.microsoft.com/office/drawing/2014/main" id="{B412599F-5D52-4A4E-B815-B3DCC9DD27C9}"/>
+              </a:ext>
+            </a:extLst>
+          </p:cNvPr>
+          <p:cNvSpPr/>
+          <p:nvPr/>
+        </p:nvSpPr>
+        <p:spPr>
+          <a:xfrm>
+            <a:off x="4428772" y="3900415"/>
+            <a:ext cx="2376264" cy="360040"/>
+          </a:xfrm>
+          <a:prstGeom prst="rect">
+            <a:avLst/>
+          </a:prstGeom>
+        </p:spPr>
+        <p:style>
+          <a:lnRef idx="2">
+            <a:schemeClr val="accent5">
+              <a:shade val="50000"/>
+            </a:schemeClr>
+          </a:lnRef>
+          <a:fillRef idx="1">
+            <a:schemeClr val="accent5"/>
+          </a:fillRef>
+          <a:effectRef idx="0">
+            <a:schemeClr val="accent5"/>
+          </a:effectRef>
+          <a:fontRef idx="minor">
+            <a:schemeClr val="lt1"/>
+          </a:fontRef>
+        </p:style>
+        <p:txBody>
+          <a:bodyPr rtlCol="0" anchor="ctr"/>
+          <a:lstStyle/>
+          <a:p>
+            <a:r>
+              <a:rPr lang="fr-FR" dirty="0"/>
+              <a:t>\n</a:t>
+            </a:r>
+          </a:p>
+        </p:txBody>
+      </p:sp>
+      <p:sp>
+        <p:nvSpPr>
+          <p:cNvPr id="18" name="Footer Placeholder 2">
+            <a:extLst>
+              <a:ext uri="{FF2B5EF4-FFF2-40B4-BE49-F238E27FC236}">
+                <a16:creationId xmlns:a16="http://schemas.microsoft.com/office/drawing/2014/main" id="{9794CF55-69A0-49D6-807E-E24CBAB92B71}"/>
+              </a:ext>
+            </a:extLst>
+          </p:cNvPr>
+          <p:cNvSpPr>
+            <a:spLocks noGrp="1"/>
+          </p:cNvSpPr>
+          <p:nvPr>
+            <p:ph type="ftr" sz="quarter" idx="11"/>
+          </p:nvPr>
+        </p:nvSpPr>
+        <p:spPr>
+          <a:xfrm>
+            <a:off x="3124200" y="6356350"/>
+            <a:ext cx="2895600" cy="365125"/>
+          </a:xfrm>
+        </p:spPr>
+        <p:txBody>
+          <a:bodyPr/>
+          <a:lstStyle/>
+          <a:p>
+            <a:r>
+              <a:rPr lang="fr-FR"/>
+              <a:t>@JLG Consulting</a:t>
+            </a:r>
+            <a:endParaRPr lang="fr-FR" dirty="0"/>
+          </a:p>
+        </p:txBody>
+      </p:sp>
+    </p:spTree>
+    <p:extLst>
+      <p:ext uri="{BB962C8B-B14F-4D97-AF65-F5344CB8AC3E}">
+        <p14:creationId xmlns:p14="http://schemas.microsoft.com/office/powerpoint/2010/main" val="3979989873"/>
       </p:ext>
     </p:extLst>
   </p:cSld>

</xml_diff>